<commit_message>
Add slides for pose estimation part.
</commit_message>
<xml_diff>
--- a/reports/report_0802/report.pptx
+++ b/reports/report_0802/report.pptx
@@ -7,6 +7,8 @@
   <p:sldIdLst>
     <p:sldId id="256" r:id="rId2"/>
     <p:sldId id="257" r:id="rId3"/>
+    <p:sldId id="259" r:id="rId4"/>
+    <p:sldId id="260" r:id="rId5"/>
   </p:sldIdLst>
   <p:sldSz cx="12192000" cy="6858000"/>
   <p:notesSz cx="6858000" cy="9144000"/>
@@ -260,7 +262,7 @@
           <a:p>
             <a:fld id="{2F5A8925-A063-5340-9628-F96EC0A1DE68}" type="datetimeFigureOut">
               <a:rPr kumimoji="1" lang="zh-CN" altLang="en-US" smtClean="0"/>
-              <a:t>2021/7/27</a:t>
+              <a:t>2021/7/31</a:t>
             </a:fld>
             <a:endParaRPr kumimoji="1" lang="zh-CN" altLang="en-US"/>
           </a:p>
@@ -458,7 +460,7 @@
           <a:p>
             <a:fld id="{2F5A8925-A063-5340-9628-F96EC0A1DE68}" type="datetimeFigureOut">
               <a:rPr kumimoji="1" lang="zh-CN" altLang="en-US" smtClean="0"/>
-              <a:t>2021/7/27</a:t>
+              <a:t>2021/7/31</a:t>
             </a:fld>
             <a:endParaRPr kumimoji="1" lang="zh-CN" altLang="en-US"/>
           </a:p>
@@ -666,7 +668,7 @@
           <a:p>
             <a:fld id="{2F5A8925-A063-5340-9628-F96EC0A1DE68}" type="datetimeFigureOut">
               <a:rPr kumimoji="1" lang="zh-CN" altLang="en-US" smtClean="0"/>
-              <a:t>2021/7/27</a:t>
+              <a:t>2021/7/31</a:t>
             </a:fld>
             <a:endParaRPr kumimoji="1" lang="zh-CN" altLang="en-US"/>
           </a:p>
@@ -864,7 +866,7 @@
           <a:p>
             <a:fld id="{2F5A8925-A063-5340-9628-F96EC0A1DE68}" type="datetimeFigureOut">
               <a:rPr kumimoji="1" lang="zh-CN" altLang="en-US" smtClean="0"/>
-              <a:t>2021/7/27</a:t>
+              <a:t>2021/7/31</a:t>
             </a:fld>
             <a:endParaRPr kumimoji="1" lang="zh-CN" altLang="en-US"/>
           </a:p>
@@ -1139,7 +1141,7 @@
           <a:p>
             <a:fld id="{2F5A8925-A063-5340-9628-F96EC0A1DE68}" type="datetimeFigureOut">
               <a:rPr kumimoji="1" lang="zh-CN" altLang="en-US" smtClean="0"/>
-              <a:t>2021/7/27</a:t>
+              <a:t>2021/7/31</a:t>
             </a:fld>
             <a:endParaRPr kumimoji="1" lang="zh-CN" altLang="en-US"/>
           </a:p>
@@ -1404,7 +1406,7 @@
           <a:p>
             <a:fld id="{2F5A8925-A063-5340-9628-F96EC0A1DE68}" type="datetimeFigureOut">
               <a:rPr kumimoji="1" lang="zh-CN" altLang="en-US" smtClean="0"/>
-              <a:t>2021/7/27</a:t>
+              <a:t>2021/7/31</a:t>
             </a:fld>
             <a:endParaRPr kumimoji="1" lang="zh-CN" altLang="en-US"/>
           </a:p>
@@ -1816,7 +1818,7 @@
           <a:p>
             <a:fld id="{2F5A8925-A063-5340-9628-F96EC0A1DE68}" type="datetimeFigureOut">
               <a:rPr kumimoji="1" lang="zh-CN" altLang="en-US" smtClean="0"/>
-              <a:t>2021/7/27</a:t>
+              <a:t>2021/7/31</a:t>
             </a:fld>
             <a:endParaRPr kumimoji="1" lang="zh-CN" altLang="en-US"/>
           </a:p>
@@ -1957,7 +1959,7 @@
           <a:p>
             <a:fld id="{2F5A8925-A063-5340-9628-F96EC0A1DE68}" type="datetimeFigureOut">
               <a:rPr kumimoji="1" lang="zh-CN" altLang="en-US" smtClean="0"/>
-              <a:t>2021/7/27</a:t>
+              <a:t>2021/7/31</a:t>
             </a:fld>
             <a:endParaRPr kumimoji="1" lang="zh-CN" altLang="en-US"/>
           </a:p>
@@ -2070,7 +2072,7 @@
           <a:p>
             <a:fld id="{2F5A8925-A063-5340-9628-F96EC0A1DE68}" type="datetimeFigureOut">
               <a:rPr kumimoji="1" lang="zh-CN" altLang="en-US" smtClean="0"/>
-              <a:t>2021/7/27</a:t>
+              <a:t>2021/7/31</a:t>
             </a:fld>
             <a:endParaRPr kumimoji="1" lang="zh-CN" altLang="en-US"/>
           </a:p>
@@ -2381,7 +2383,7 @@
           <a:p>
             <a:fld id="{2F5A8925-A063-5340-9628-F96EC0A1DE68}" type="datetimeFigureOut">
               <a:rPr kumimoji="1" lang="zh-CN" altLang="en-US" smtClean="0"/>
-              <a:t>2021/7/27</a:t>
+              <a:t>2021/7/31</a:t>
             </a:fld>
             <a:endParaRPr kumimoji="1" lang="zh-CN" altLang="en-US"/>
           </a:p>
@@ -2669,7 +2671,7 @@
           <a:p>
             <a:fld id="{2F5A8925-A063-5340-9628-F96EC0A1DE68}" type="datetimeFigureOut">
               <a:rPr kumimoji="1" lang="zh-CN" altLang="en-US" smtClean="0"/>
-              <a:t>2021/7/27</a:t>
+              <a:t>2021/7/31</a:t>
             </a:fld>
             <a:endParaRPr kumimoji="1" lang="zh-CN" altLang="en-US"/>
           </a:p>
@@ -2910,7 +2912,7 @@
           <a:p>
             <a:fld id="{2F5A8925-A063-5340-9628-F96EC0A1DE68}" type="datetimeFigureOut">
               <a:rPr kumimoji="1" lang="zh-CN" altLang="en-US" smtClean="0"/>
-              <a:t>2021/7/27</a:t>
+              <a:t>2021/7/31</a:t>
             </a:fld>
             <a:endParaRPr kumimoji="1" lang="zh-CN" altLang="en-US"/>
           </a:p>
@@ -3557,6 +3559,1585 @@
 </p:sld>
 </file>
 
+<file path=ppt/slides/slide3.xml><?xml version="1.0" encoding="utf-8"?>
+<p:sld xmlns:a="http://schemas.openxmlformats.org/drawingml/2006/main" xmlns:r="http://schemas.openxmlformats.org/officeDocument/2006/relationships" xmlns:p="http://schemas.openxmlformats.org/presentationml/2006/main">
+  <p:cSld>
+    <p:spTree>
+      <p:nvGrpSpPr>
+        <p:cNvPr id="1" name=""/>
+        <p:cNvGrpSpPr/>
+        <p:nvPr/>
+      </p:nvGrpSpPr>
+      <p:grpSpPr>
+        <a:xfrm>
+          <a:off x="0" y="0"/>
+          <a:ext cx="0" cy="0"/>
+          <a:chOff x="0" y="0"/>
+          <a:chExt cx="0" cy="0"/>
+        </a:xfrm>
+      </p:grpSpPr>
+      <p:sp>
+        <p:nvSpPr>
+          <p:cNvPr id="4" name="文本框 3">
+            <a:extLst>
+              <a:ext uri="{FF2B5EF4-FFF2-40B4-BE49-F238E27FC236}">
+                <a16:creationId xmlns:a16="http://schemas.microsoft.com/office/drawing/2014/main" id="{BE485481-2E10-9E42-BC79-A6525F0164EB}"/>
+              </a:ext>
+            </a:extLst>
+          </p:cNvPr>
+          <p:cNvSpPr txBox="1"/>
+          <p:nvPr/>
+        </p:nvSpPr>
+        <p:spPr>
+          <a:xfrm>
+            <a:off x="193963" y="207819"/>
+            <a:ext cx="4403770" cy="369332"/>
+          </a:xfrm>
+          <a:prstGeom prst="rect">
+            <a:avLst/>
+          </a:prstGeom>
+          <a:noFill/>
+        </p:spPr>
+        <p:txBody>
+          <a:bodyPr wrap="none" rtlCol="0">
+            <a:spAutoFit/>
+          </a:bodyPr>
+          <a:lstStyle/>
+          <a:p>
+            <a:r>
+              <a:rPr kumimoji="1" lang="zh-CN" altLang="en-US" b="1" dirty="0"/>
+              <a:t>多目标多视角三维骨架重建</a:t>
+            </a:r>
+            <a:r>
+              <a:rPr kumimoji="1" lang="en-US" altLang="zh-CN" b="1" dirty="0"/>
+              <a:t>——</a:t>
+            </a:r>
+            <a:r>
+              <a:rPr kumimoji="1" lang="zh-CN" altLang="en-US" b="1" dirty="0"/>
+              <a:t>文献调研</a:t>
+            </a:r>
+          </a:p>
+        </p:txBody>
+      </p:sp>
+      <p:sp>
+        <p:nvSpPr>
+          <p:cNvPr id="7" name="文本框 6">
+            <a:extLst>
+              <a:ext uri="{FF2B5EF4-FFF2-40B4-BE49-F238E27FC236}">
+                <a16:creationId xmlns:a16="http://schemas.microsoft.com/office/drawing/2014/main" id="{9E0F237B-27C7-4A32-A81B-77461A3796D3}"/>
+              </a:ext>
+            </a:extLst>
+          </p:cNvPr>
+          <p:cNvSpPr txBox="1"/>
+          <p:nvPr/>
+        </p:nvSpPr>
+        <p:spPr>
+          <a:xfrm>
+            <a:off x="193963" y="854349"/>
+            <a:ext cx="3483646" cy="646331"/>
+          </a:xfrm>
+          <a:prstGeom prst="rect">
+            <a:avLst/>
+          </a:prstGeom>
+          <a:noFill/>
+        </p:spPr>
+        <p:txBody>
+          <a:bodyPr wrap="none" rtlCol="0">
+            <a:spAutoFit/>
+          </a:bodyPr>
+          <a:lstStyle/>
+          <a:p>
+            <a:pPr marL="285750" indent="-285750">
+              <a:buFont typeface="Wingdings" pitchFamily="2" charset="2"/>
+              <a:buChar char="Ø"/>
+            </a:pPr>
+            <a:r>
+              <a:rPr kumimoji="1" lang="zh-CN" altLang="en-US" dirty="0"/>
+              <a:t>多阶段方法 </a:t>
+            </a:r>
+            <a:r>
+              <a:rPr kumimoji="1" lang="en-US" altLang="zh-CN" dirty="0"/>
+              <a:t>– </a:t>
+            </a:r>
+            <a:r>
+              <a:rPr kumimoji="1" lang="zh-CN" altLang="en-US" dirty="0"/>
+              <a:t>显式的</a:t>
+            </a:r>
+            <a:r>
+              <a:rPr kumimoji="1" lang="zh-CN" altLang="en-US" b="1" dirty="0"/>
+              <a:t>视角匹配</a:t>
+            </a:r>
+            <a:endParaRPr kumimoji="1" lang="en-US" altLang="zh-CN" b="1" dirty="0"/>
+          </a:p>
+          <a:p>
+            <a:pPr marL="742950" lvl="1" indent="-285750">
+              <a:buFont typeface="Wingdings" pitchFamily="2" charset="2"/>
+              <a:buChar char="Ø"/>
+            </a:pPr>
+            <a:endParaRPr kumimoji="1" lang="en-US" altLang="zh-CN" b="1" dirty="0"/>
+          </a:p>
+        </p:txBody>
+      </p:sp>
+      <p:sp>
+        <p:nvSpPr>
+          <p:cNvPr id="8" name="文本框 7">
+            <a:extLst>
+              <a:ext uri="{FF2B5EF4-FFF2-40B4-BE49-F238E27FC236}">
+                <a16:creationId xmlns:a16="http://schemas.microsoft.com/office/drawing/2014/main" id="{441F4BAA-97C4-46DC-BE04-8B09D4402A13}"/>
+              </a:ext>
+            </a:extLst>
+          </p:cNvPr>
+          <p:cNvSpPr txBox="1"/>
+          <p:nvPr/>
+        </p:nvSpPr>
+        <p:spPr>
+          <a:xfrm>
+            <a:off x="6096000" y="854349"/>
+            <a:ext cx="3714478" cy="369332"/>
+          </a:xfrm>
+          <a:prstGeom prst="rect">
+            <a:avLst/>
+          </a:prstGeom>
+          <a:noFill/>
+        </p:spPr>
+        <p:txBody>
+          <a:bodyPr wrap="none" rtlCol="0">
+            <a:spAutoFit/>
+          </a:bodyPr>
+          <a:lstStyle/>
+          <a:p>
+            <a:pPr marL="285750" indent="-285750">
+              <a:buFont typeface="Wingdings" pitchFamily="2" charset="2"/>
+              <a:buChar char="Ø"/>
+            </a:pPr>
+            <a:r>
+              <a:rPr kumimoji="1" lang="zh-CN" altLang="en-US" dirty="0"/>
+              <a:t>单阶段方法 </a:t>
+            </a:r>
+            <a:r>
+              <a:rPr kumimoji="1" lang="en-US" altLang="zh-CN" dirty="0"/>
+              <a:t>– </a:t>
+            </a:r>
+            <a:r>
+              <a:rPr kumimoji="1" lang="zh-CN" altLang="en-US" dirty="0"/>
+              <a:t>无显式的</a:t>
+            </a:r>
+            <a:r>
+              <a:rPr kumimoji="1" lang="zh-CN" altLang="en-US" b="1" dirty="0"/>
+              <a:t>视角匹配</a:t>
+            </a:r>
+            <a:endParaRPr kumimoji="1" lang="en-US" altLang="zh-CN" b="1" dirty="0"/>
+          </a:p>
+        </p:txBody>
+      </p:sp>
+      <p:sp>
+        <p:nvSpPr>
+          <p:cNvPr id="9" name="文本框 8">
+            <a:extLst>
+              <a:ext uri="{FF2B5EF4-FFF2-40B4-BE49-F238E27FC236}">
+                <a16:creationId xmlns:a16="http://schemas.microsoft.com/office/drawing/2014/main" id="{CF92EB1F-165F-455B-A695-CCA7EB52C9DA}"/>
+              </a:ext>
+            </a:extLst>
+          </p:cNvPr>
+          <p:cNvSpPr txBox="1"/>
+          <p:nvPr/>
+        </p:nvSpPr>
+        <p:spPr>
+          <a:xfrm>
+            <a:off x="6096000" y="207819"/>
+            <a:ext cx="4570482" cy="369332"/>
+          </a:xfrm>
+          <a:prstGeom prst="rect">
+            <a:avLst/>
+          </a:prstGeom>
+          <a:noFill/>
+        </p:spPr>
+        <p:txBody>
+          <a:bodyPr wrap="none" rtlCol="0">
+            <a:spAutoFit/>
+          </a:bodyPr>
+          <a:lstStyle/>
+          <a:p>
+            <a:r>
+              <a:rPr kumimoji="1" lang="zh-CN" altLang="en-US" dirty="0"/>
+              <a:t>难点：需解决目标在不同视角中的匹配问题</a:t>
+            </a:r>
+          </a:p>
+        </p:txBody>
+      </p:sp>
+      <p:sp>
+        <p:nvSpPr>
+          <p:cNvPr id="10" name="文本框 9">
+            <a:extLst>
+              <a:ext uri="{FF2B5EF4-FFF2-40B4-BE49-F238E27FC236}">
+                <a16:creationId xmlns:a16="http://schemas.microsoft.com/office/drawing/2014/main" id="{3EA80DEB-0E1C-49DA-B875-C827BC742752}"/>
+              </a:ext>
+            </a:extLst>
+          </p:cNvPr>
+          <p:cNvSpPr txBox="1"/>
+          <p:nvPr/>
+        </p:nvSpPr>
+        <p:spPr>
+          <a:xfrm>
+            <a:off x="498763" y="1223681"/>
+            <a:ext cx="5721438" cy="923330"/>
+          </a:xfrm>
+          <a:prstGeom prst="rect">
+            <a:avLst/>
+          </a:prstGeom>
+          <a:noFill/>
+        </p:spPr>
+        <p:txBody>
+          <a:bodyPr wrap="none" rtlCol="0">
+            <a:spAutoFit/>
+          </a:bodyPr>
+          <a:lstStyle/>
+          <a:p>
+            <a:pPr marL="342900" indent="-342900">
+              <a:buFont typeface="+mj-lt"/>
+              <a:buAutoNum type="arabicPeriod"/>
+            </a:pPr>
+            <a:r>
+              <a:rPr kumimoji="1" lang="zh-CN" altLang="en-US" dirty="0"/>
+              <a:t>不同视角分别进行</a:t>
+            </a:r>
+            <a:r>
+              <a:rPr kumimoji="1" lang="en-US" altLang="zh-CN" dirty="0"/>
+              <a:t>2D</a:t>
+            </a:r>
+            <a:r>
+              <a:rPr kumimoji="1" lang="zh-CN" altLang="en-US" dirty="0"/>
+              <a:t>骨架估计</a:t>
+            </a:r>
+            <a:endParaRPr kumimoji="1" lang="en-US" altLang="zh-CN" dirty="0"/>
+          </a:p>
+          <a:p>
+            <a:pPr marL="342900" indent="-342900">
+              <a:buFont typeface="+mj-lt"/>
+              <a:buAutoNum type="arabicPeriod"/>
+            </a:pPr>
+            <a:r>
+              <a:rPr kumimoji="1" lang="zh-CN" altLang="en-US" dirty="0"/>
+              <a:t>确定单个目标在不同视角中的</a:t>
+            </a:r>
+            <a:r>
+              <a:rPr kumimoji="1" lang="en-US" altLang="zh-CN" dirty="0"/>
+              <a:t>2D</a:t>
+            </a:r>
+            <a:r>
+              <a:rPr kumimoji="1" lang="zh-CN" altLang="en-US" dirty="0"/>
+              <a:t>骨架 （</a:t>
+            </a:r>
+            <a:r>
+              <a:rPr kumimoji="1" lang="zh-CN" altLang="en-US" b="1" dirty="0"/>
+              <a:t>视角匹配</a:t>
+            </a:r>
+            <a:r>
+              <a:rPr kumimoji="1" lang="zh-CN" altLang="en-US" dirty="0"/>
+              <a:t>）</a:t>
+            </a:r>
+            <a:endParaRPr kumimoji="1" lang="en-US" altLang="zh-CN" dirty="0"/>
+          </a:p>
+          <a:p>
+            <a:pPr marL="342900" indent="-342900">
+              <a:buFont typeface="+mj-lt"/>
+              <a:buAutoNum type="arabicPeriod"/>
+            </a:pPr>
+            <a:r>
+              <a:rPr kumimoji="1" lang="zh-CN" altLang="en-US" dirty="0"/>
+              <a:t>对每个单目标，由多视角的</a:t>
+            </a:r>
+            <a:r>
+              <a:rPr kumimoji="1" lang="en-US" altLang="zh-CN" dirty="0"/>
+              <a:t>2D</a:t>
+            </a:r>
+            <a:r>
+              <a:rPr kumimoji="1" lang="zh-CN" altLang="en-US" dirty="0"/>
+              <a:t>骨架估计</a:t>
+            </a:r>
+            <a:r>
+              <a:rPr kumimoji="1" lang="en-US" altLang="zh-CN" dirty="0"/>
+              <a:t>3D</a:t>
+            </a:r>
+            <a:r>
+              <a:rPr kumimoji="1" lang="zh-CN" altLang="en-US" dirty="0"/>
+              <a:t>骨架</a:t>
+            </a:r>
+            <a:endParaRPr kumimoji="1" lang="en-US" altLang="zh-CN" dirty="0"/>
+          </a:p>
+        </p:txBody>
+      </p:sp>
+      <p:sp>
+        <p:nvSpPr>
+          <p:cNvPr id="11" name="文本框 10">
+            <a:extLst>
+              <a:ext uri="{FF2B5EF4-FFF2-40B4-BE49-F238E27FC236}">
+                <a16:creationId xmlns:a16="http://schemas.microsoft.com/office/drawing/2014/main" id="{1617CFC0-2870-4DA1-8B97-54318B5CE7A6}"/>
+              </a:ext>
+            </a:extLst>
+          </p:cNvPr>
+          <p:cNvSpPr txBox="1"/>
+          <p:nvPr/>
+        </p:nvSpPr>
+        <p:spPr>
+          <a:xfrm>
+            <a:off x="193963" y="2384053"/>
+            <a:ext cx="1858201" cy="369332"/>
+          </a:xfrm>
+          <a:prstGeom prst="rect">
+            <a:avLst/>
+          </a:prstGeom>
+          <a:noFill/>
+        </p:spPr>
+        <p:txBody>
+          <a:bodyPr wrap="none" rtlCol="0">
+            <a:spAutoFit/>
+          </a:bodyPr>
+          <a:lstStyle/>
+          <a:p>
+            <a:pPr marL="285750" indent="-285750">
+              <a:buFont typeface="Wingdings" pitchFamily="2" charset="2"/>
+              <a:buChar char="Ø"/>
+            </a:pPr>
+            <a:r>
+              <a:rPr kumimoji="1" lang="zh-CN" altLang="en-US" dirty="0"/>
+              <a:t>视角匹配方法</a:t>
+            </a:r>
+            <a:endParaRPr kumimoji="1" lang="en-US" altLang="zh-CN" b="1" dirty="0"/>
+          </a:p>
+        </p:txBody>
+      </p:sp>
+      <p:sp>
+        <p:nvSpPr>
+          <p:cNvPr id="12" name="文本框 11">
+            <a:extLst>
+              <a:ext uri="{FF2B5EF4-FFF2-40B4-BE49-F238E27FC236}">
+                <a16:creationId xmlns:a16="http://schemas.microsoft.com/office/drawing/2014/main" id="{73DF6082-ED25-4767-8A28-B51B7B707614}"/>
+              </a:ext>
+            </a:extLst>
+          </p:cNvPr>
+          <p:cNvSpPr txBox="1"/>
+          <p:nvPr/>
+        </p:nvSpPr>
+        <p:spPr>
+          <a:xfrm>
+            <a:off x="498763" y="2694226"/>
+            <a:ext cx="2010487" cy="369332"/>
+          </a:xfrm>
+          <a:prstGeom prst="rect">
+            <a:avLst/>
+          </a:prstGeom>
+          <a:noFill/>
+        </p:spPr>
+        <p:txBody>
+          <a:bodyPr wrap="none" rtlCol="0">
+            <a:spAutoFit/>
+          </a:bodyPr>
+          <a:lstStyle/>
+          <a:p>
+            <a:pPr marL="285750" indent="-285750">
+              <a:buFont typeface="Arial" panose="020B0604020202020204" pitchFamily="34" charset="0"/>
+              <a:buChar char="•"/>
+            </a:pPr>
+            <a:r>
+              <a:rPr kumimoji="1" lang="en-US" altLang="zh-CN" b="1" dirty="0"/>
+              <a:t>ReID</a:t>
+            </a:r>
+            <a:r>
+              <a:rPr kumimoji="1" lang="zh-CN" altLang="en-US" b="1" dirty="0"/>
+              <a:t> </a:t>
+            </a:r>
+            <a:r>
+              <a:rPr kumimoji="1" lang="en-US" altLang="zh-CN" b="1" dirty="0"/>
+              <a:t>Feature</a:t>
+            </a:r>
+            <a:r>
+              <a:rPr kumimoji="1" lang="en-US" altLang="zh-CN" b="1" baseline="30000" dirty="0"/>
+              <a:t>[1]</a:t>
+            </a:r>
+            <a:endParaRPr kumimoji="1" lang="zh-CN" altLang="en-US" b="1" baseline="30000" dirty="0"/>
+          </a:p>
+        </p:txBody>
+      </p:sp>
+      <p:sp>
+        <p:nvSpPr>
+          <p:cNvPr id="14" name="文本框 13">
+            <a:extLst>
+              <a:ext uri="{FF2B5EF4-FFF2-40B4-BE49-F238E27FC236}">
+                <a16:creationId xmlns:a16="http://schemas.microsoft.com/office/drawing/2014/main" id="{A4FEE929-05A9-47E9-9A2D-B6E31E5EBA74}"/>
+              </a:ext>
+            </a:extLst>
+          </p:cNvPr>
+          <p:cNvSpPr txBox="1"/>
+          <p:nvPr/>
+        </p:nvSpPr>
+        <p:spPr>
+          <a:xfrm>
+            <a:off x="498762" y="3009628"/>
+            <a:ext cx="4035079" cy="369332"/>
+          </a:xfrm>
+          <a:prstGeom prst="rect">
+            <a:avLst/>
+          </a:prstGeom>
+          <a:noFill/>
+        </p:spPr>
+        <p:txBody>
+          <a:bodyPr wrap="none" rtlCol="0">
+            <a:spAutoFit/>
+          </a:bodyPr>
+          <a:lstStyle/>
+          <a:p>
+            <a:pPr marL="285750" indent="-285750">
+              <a:buFont typeface="Arial" panose="020B0604020202020204" pitchFamily="34" charset="0"/>
+              <a:buChar char="•"/>
+            </a:pPr>
+            <a:r>
+              <a:rPr lang="en-US" altLang="zh-CN" dirty="0"/>
+              <a:t>B</a:t>
+            </a:r>
+            <a:r>
+              <a:rPr lang="zh-CN" altLang="en-US" dirty="0"/>
+              <a:t>ased on the epipolar constraint</a:t>
+            </a:r>
+            <a:r>
+              <a:rPr lang="en-US" altLang="zh-CN" dirty="0"/>
+              <a:t>s</a:t>
+            </a:r>
+            <a:r>
+              <a:rPr lang="en-US" altLang="zh-CN" baseline="30000" dirty="0"/>
+              <a:t>[2]</a:t>
+            </a:r>
+            <a:endParaRPr lang="zh-CN" altLang="en-US" baseline="30000" dirty="0"/>
+          </a:p>
+        </p:txBody>
+      </p:sp>
+      <p:sp>
+        <p:nvSpPr>
+          <p:cNvPr id="15" name="文本框 14">
+            <a:extLst>
+              <a:ext uri="{FF2B5EF4-FFF2-40B4-BE49-F238E27FC236}">
+                <a16:creationId xmlns:a16="http://schemas.microsoft.com/office/drawing/2014/main" id="{FB47B409-7BCD-4C4D-9500-80C2B740E961}"/>
+              </a:ext>
+            </a:extLst>
+          </p:cNvPr>
+          <p:cNvSpPr txBox="1"/>
+          <p:nvPr/>
+        </p:nvSpPr>
+        <p:spPr>
+          <a:xfrm>
+            <a:off x="498761" y="3340557"/>
+            <a:ext cx="2377574" cy="369332"/>
+          </a:xfrm>
+          <a:prstGeom prst="rect">
+            <a:avLst/>
+          </a:prstGeom>
+          <a:noFill/>
+        </p:spPr>
+        <p:txBody>
+          <a:bodyPr wrap="none" rtlCol="0">
+            <a:spAutoFit/>
+          </a:bodyPr>
+          <a:lstStyle/>
+          <a:p>
+            <a:pPr marL="285750" indent="-285750">
+              <a:buFont typeface="Arial" panose="020B0604020202020204" pitchFamily="34" charset="0"/>
+              <a:buChar char="•"/>
+            </a:pPr>
+            <a:r>
+              <a:rPr lang="en-US" altLang="zh-CN" dirty="0"/>
+              <a:t>Greedy clustering</a:t>
+            </a:r>
+            <a:r>
+              <a:rPr lang="en-US" altLang="zh-CN" baseline="30000" dirty="0"/>
+              <a:t>[3]</a:t>
+            </a:r>
+            <a:endParaRPr lang="zh-CN" altLang="en-US" baseline="30000" dirty="0"/>
+          </a:p>
+        </p:txBody>
+      </p:sp>
+      <p:pic>
+        <p:nvPicPr>
+          <p:cNvPr id="17" name="图片 16">
+            <a:extLst>
+              <a:ext uri="{FF2B5EF4-FFF2-40B4-BE49-F238E27FC236}">
+                <a16:creationId xmlns:a16="http://schemas.microsoft.com/office/drawing/2014/main" id="{8C006755-B974-41CE-B652-92CCDDB7EEC7}"/>
+              </a:ext>
+            </a:extLst>
+          </p:cNvPr>
+          <p:cNvPicPr>
+            <a:picLocks noChangeAspect="1"/>
+          </p:cNvPicPr>
+          <p:nvPr/>
+        </p:nvPicPr>
+        <p:blipFill>
+          <a:blip r:embed="rId2"/>
+          <a:stretch>
+            <a:fillRect/>
+          </a:stretch>
+        </p:blipFill>
+        <p:spPr>
+          <a:xfrm>
+            <a:off x="385762" y="3741052"/>
+            <a:ext cx="5710238" cy="2324100"/>
+          </a:xfrm>
+          <a:prstGeom prst="rect">
+            <a:avLst/>
+          </a:prstGeom>
+        </p:spPr>
+      </p:pic>
+      <p:sp>
+        <p:nvSpPr>
+          <p:cNvPr id="19" name="文本框 18">
+            <a:extLst>
+              <a:ext uri="{FF2B5EF4-FFF2-40B4-BE49-F238E27FC236}">
+                <a16:creationId xmlns:a16="http://schemas.microsoft.com/office/drawing/2014/main" id="{2316204A-034F-4E2A-8F5F-8727D4314C21}"/>
+              </a:ext>
+            </a:extLst>
+          </p:cNvPr>
+          <p:cNvSpPr txBox="1"/>
+          <p:nvPr/>
+        </p:nvSpPr>
+        <p:spPr>
+          <a:xfrm>
+            <a:off x="0" y="2127810"/>
+            <a:ext cx="6096000" cy="369332"/>
+          </a:xfrm>
+          <a:prstGeom prst="rect">
+            <a:avLst/>
+          </a:prstGeom>
+          <a:noFill/>
+        </p:spPr>
+        <p:txBody>
+          <a:bodyPr wrap="square">
+            <a:spAutoFit/>
+          </a:bodyPr>
+          <a:lstStyle/>
+          <a:p>
+            <a:pPr algn="ctr"/>
+            <a:r>
+              <a:rPr kumimoji="1" lang="zh-CN" altLang="en-US" b="1" dirty="0"/>
+              <a:t>多目标 → 单目标</a:t>
+            </a:r>
+          </a:p>
+        </p:txBody>
+      </p:sp>
+      <p:pic>
+        <p:nvPicPr>
+          <p:cNvPr id="21" name="图片 20">
+            <a:extLst>
+              <a:ext uri="{FF2B5EF4-FFF2-40B4-BE49-F238E27FC236}">
+                <a16:creationId xmlns:a16="http://schemas.microsoft.com/office/drawing/2014/main" id="{B8F1A710-7291-42B4-B462-F64BC477E2FC}"/>
+              </a:ext>
+            </a:extLst>
+          </p:cNvPr>
+          <p:cNvPicPr>
+            <a:picLocks noChangeAspect="1"/>
+          </p:cNvPicPr>
+          <p:nvPr/>
+        </p:nvPicPr>
+        <p:blipFill>
+          <a:blip r:embed="rId3"/>
+          <a:stretch>
+            <a:fillRect/>
+          </a:stretch>
+        </p:blipFill>
+        <p:spPr>
+          <a:xfrm>
+            <a:off x="5927154" y="1168415"/>
+            <a:ext cx="6275905" cy="2160000"/>
+          </a:xfrm>
+          <a:prstGeom prst="rect">
+            <a:avLst/>
+          </a:prstGeom>
+        </p:spPr>
+      </p:pic>
+      <p:sp>
+        <p:nvSpPr>
+          <p:cNvPr id="23" name="文本框 22">
+            <a:extLst>
+              <a:ext uri="{FF2B5EF4-FFF2-40B4-BE49-F238E27FC236}">
+                <a16:creationId xmlns:a16="http://schemas.microsoft.com/office/drawing/2014/main" id="{75BB2183-7346-4052-9AF2-69645C68E941}"/>
+              </a:ext>
+            </a:extLst>
+          </p:cNvPr>
+          <p:cNvSpPr txBox="1"/>
+          <p:nvPr/>
+        </p:nvSpPr>
+        <p:spPr>
+          <a:xfrm>
+            <a:off x="5798296" y="3200228"/>
+            <a:ext cx="6565604" cy="369332"/>
+          </a:xfrm>
+          <a:prstGeom prst="rect">
+            <a:avLst/>
+          </a:prstGeom>
+          <a:noFill/>
+        </p:spPr>
+        <p:txBody>
+          <a:bodyPr wrap="square">
+            <a:spAutoFit/>
+          </a:bodyPr>
+          <a:lstStyle/>
+          <a:p>
+            <a:r>
+              <a:rPr lang="en-US" altLang="zh-CN" dirty="0"/>
+              <a:t>Back-project the heatmaps of all views to a common 3D space</a:t>
+            </a:r>
+            <a:r>
+              <a:rPr lang="en-US" altLang="zh-CN" baseline="30000" dirty="0"/>
+              <a:t>[4]</a:t>
+            </a:r>
+            <a:endParaRPr lang="zh-CN" altLang="en-US" baseline="30000" dirty="0"/>
+          </a:p>
+        </p:txBody>
+      </p:sp>
+      <p:pic>
+        <p:nvPicPr>
+          <p:cNvPr id="27" name="图片 26">
+            <a:extLst>
+              <a:ext uri="{FF2B5EF4-FFF2-40B4-BE49-F238E27FC236}">
+                <a16:creationId xmlns:a16="http://schemas.microsoft.com/office/drawing/2014/main" id="{614BCC07-F314-4A56-BBD4-05442B245073}"/>
+              </a:ext>
+            </a:extLst>
+          </p:cNvPr>
+          <p:cNvPicPr>
+            <a:picLocks noChangeAspect="1"/>
+          </p:cNvPicPr>
+          <p:nvPr/>
+        </p:nvPicPr>
+        <p:blipFill>
+          <a:blip r:embed="rId4"/>
+          <a:stretch>
+            <a:fillRect/>
+          </a:stretch>
+        </p:blipFill>
+        <p:spPr>
+          <a:xfrm>
+            <a:off x="6549654" y="3553621"/>
+            <a:ext cx="4683403" cy="2972463"/>
+          </a:xfrm>
+          <a:prstGeom prst="rect">
+            <a:avLst/>
+          </a:prstGeom>
+        </p:spPr>
+      </p:pic>
+      <p:sp>
+        <p:nvSpPr>
+          <p:cNvPr id="29" name="文本框 28">
+            <a:extLst>
+              <a:ext uri="{FF2B5EF4-FFF2-40B4-BE49-F238E27FC236}">
+                <a16:creationId xmlns:a16="http://schemas.microsoft.com/office/drawing/2014/main" id="{5A19610E-4083-401D-9E75-B0247ECCFD3A}"/>
+              </a:ext>
+            </a:extLst>
+          </p:cNvPr>
+          <p:cNvSpPr txBox="1"/>
+          <p:nvPr/>
+        </p:nvSpPr>
+        <p:spPr>
+          <a:xfrm>
+            <a:off x="5796811" y="6313828"/>
+            <a:ext cx="7295412" cy="369332"/>
+          </a:xfrm>
+          <a:prstGeom prst="rect">
+            <a:avLst/>
+          </a:prstGeom>
+          <a:noFill/>
+        </p:spPr>
+        <p:txBody>
+          <a:bodyPr wrap="square">
+            <a:spAutoFit/>
+          </a:bodyPr>
+          <a:lstStyle/>
+          <a:p>
+            <a:r>
+              <a:rPr lang="en-US" altLang="zh-CN" dirty="0"/>
+              <a:t>B</a:t>
+            </a:r>
+            <a:r>
+              <a:rPr lang="zh-CN" altLang="en-US" dirty="0"/>
+              <a:t>ack-projecte </a:t>
+            </a:r>
+            <a:r>
+              <a:rPr lang="en-US" altLang="zh-CN" dirty="0"/>
+              <a:t>2D poses</a:t>
+            </a:r>
+            <a:r>
+              <a:rPr lang="zh-CN" altLang="en-US" dirty="0"/>
+              <a:t> to successive virtual depth planes</a:t>
+            </a:r>
+            <a:r>
+              <a:rPr lang="en-US" altLang="zh-CN" baseline="30000" dirty="0"/>
+              <a:t>[5]</a:t>
+            </a:r>
+            <a:endParaRPr lang="zh-CN" altLang="en-US" baseline="30000" dirty="0"/>
+          </a:p>
+        </p:txBody>
+      </p:sp>
+      <p:sp>
+        <p:nvSpPr>
+          <p:cNvPr id="31" name="文本框 30">
+            <a:extLst>
+              <a:ext uri="{FF2B5EF4-FFF2-40B4-BE49-F238E27FC236}">
+                <a16:creationId xmlns:a16="http://schemas.microsoft.com/office/drawing/2014/main" id="{40E3D05B-32AF-4B6E-BC72-ED794FEB0159}"/>
+              </a:ext>
+            </a:extLst>
+          </p:cNvPr>
+          <p:cNvSpPr txBox="1"/>
+          <p:nvPr/>
+        </p:nvSpPr>
+        <p:spPr>
+          <a:xfrm>
+            <a:off x="193963" y="5939317"/>
+            <a:ext cx="6565604" cy="861774"/>
+          </a:xfrm>
+          <a:prstGeom prst="rect">
+            <a:avLst/>
+          </a:prstGeom>
+          <a:noFill/>
+        </p:spPr>
+        <p:txBody>
+          <a:bodyPr wrap="square">
+            <a:spAutoFit/>
+          </a:bodyPr>
+          <a:lstStyle/>
+          <a:p>
+            <a:r>
+              <a:rPr lang="en-US" altLang="zh-CN" sz="1000" dirty="0"/>
+              <a:t>[1] </a:t>
+            </a:r>
+            <a:r>
+              <a:rPr lang="zh-CN" altLang="en-US" sz="1000" dirty="0"/>
+              <a:t>Junting Dong, </a:t>
+            </a:r>
+            <a:r>
+              <a:rPr lang="en-US" altLang="zh-CN" sz="1000" dirty="0"/>
+              <a:t>et al. </a:t>
+            </a:r>
+            <a:r>
+              <a:rPr lang="zh-CN" altLang="en-US" sz="1000" dirty="0"/>
+              <a:t>Proceedings of the IEEE Conference on Computer Vision and Pattern Recognition</a:t>
+            </a:r>
+            <a:r>
+              <a:rPr lang="en-US" altLang="zh-CN" sz="1000" dirty="0"/>
+              <a:t>, 2019.</a:t>
+            </a:r>
+          </a:p>
+          <a:p>
+            <a:r>
+              <a:rPr lang="en-US" altLang="zh-CN" sz="1000" dirty="0"/>
+              <a:t>[2] </a:t>
+            </a:r>
+            <a:r>
+              <a:rPr lang="en-US" altLang="zh-CN" sz="1000" dirty="0" err="1"/>
+              <a:t>Abdolrahim</a:t>
+            </a:r>
+            <a:r>
+              <a:rPr lang="en-US" altLang="zh-CN" sz="1000" dirty="0"/>
+              <a:t> </a:t>
+            </a:r>
+            <a:r>
+              <a:rPr lang="en-US" altLang="zh-CN" sz="1000" dirty="0" err="1"/>
+              <a:t>Kadkhodamohammadi</a:t>
+            </a:r>
+            <a:r>
+              <a:rPr lang="en-US" altLang="zh-CN" sz="1000" dirty="0"/>
+              <a:t> et al. Machine Vision and Applications, 2020.</a:t>
+            </a:r>
+          </a:p>
+          <a:p>
+            <a:r>
+              <a:rPr lang="en-US" altLang="zh-CN" sz="1000" dirty="0"/>
+              <a:t>[3] </a:t>
+            </a:r>
+            <a:r>
+              <a:rPr lang="en-US" altLang="zh-CN" sz="1000" dirty="0" err="1"/>
+              <a:t>Congzhentao</a:t>
+            </a:r>
+            <a:r>
+              <a:rPr lang="en-US" altLang="zh-CN" sz="1000" dirty="0"/>
+              <a:t> et al. Proceedings of the European Conference on Computer Vision, 2020.</a:t>
+            </a:r>
+          </a:p>
+          <a:p>
+            <a:r>
+              <a:rPr lang="en-US" altLang="zh-CN" sz="1000" dirty="0"/>
+              <a:t>[4] Tu H, et al. Computer Vision–ECCV 2020: 16th European Conference, 2020.</a:t>
+            </a:r>
+          </a:p>
+          <a:p>
+            <a:r>
+              <a:rPr lang="en-US" altLang="zh-CN" sz="1000" dirty="0"/>
+              <a:t>[5] Lin J, et al. Proceedings of the IEEE/CVF Conference on Computer Vision and Pattern Recognition. 2021.</a:t>
+            </a:r>
+            <a:endParaRPr lang="zh-CN" altLang="en-US" sz="1000" dirty="0"/>
+          </a:p>
+        </p:txBody>
+      </p:sp>
+    </p:spTree>
+    <p:extLst>
+      <p:ext uri="{BB962C8B-B14F-4D97-AF65-F5344CB8AC3E}">
+        <p14:creationId xmlns:p14="http://schemas.microsoft.com/office/powerpoint/2010/main" val="219145974"/>
+      </p:ext>
+    </p:extLst>
+  </p:cSld>
+  <p:clrMapOvr>
+    <a:masterClrMapping/>
+  </p:clrMapOvr>
+</p:sld>
+</file>
+
+<file path=ppt/slides/slide4.xml><?xml version="1.0" encoding="utf-8"?>
+<p:sld xmlns:a="http://schemas.openxmlformats.org/drawingml/2006/main" xmlns:r="http://schemas.openxmlformats.org/officeDocument/2006/relationships" xmlns:p="http://schemas.openxmlformats.org/presentationml/2006/main">
+  <p:cSld>
+    <p:spTree>
+      <p:nvGrpSpPr>
+        <p:cNvPr id="1" name=""/>
+        <p:cNvGrpSpPr/>
+        <p:nvPr/>
+      </p:nvGrpSpPr>
+      <p:grpSpPr>
+        <a:xfrm>
+          <a:off x="0" y="0"/>
+          <a:ext cx="0" cy="0"/>
+          <a:chOff x="0" y="0"/>
+          <a:chExt cx="0" cy="0"/>
+        </a:xfrm>
+      </p:grpSpPr>
+      <p:sp>
+        <p:nvSpPr>
+          <p:cNvPr id="4" name="文本框 3">
+            <a:extLst>
+              <a:ext uri="{FF2B5EF4-FFF2-40B4-BE49-F238E27FC236}">
+                <a16:creationId xmlns:a16="http://schemas.microsoft.com/office/drawing/2014/main" id="{BE485481-2E10-9E42-BC79-A6525F0164EB}"/>
+              </a:ext>
+            </a:extLst>
+          </p:cNvPr>
+          <p:cNvSpPr txBox="1"/>
+          <p:nvPr/>
+        </p:nvSpPr>
+        <p:spPr>
+          <a:xfrm>
+            <a:off x="193963" y="207819"/>
+            <a:ext cx="4305987" cy="369332"/>
+          </a:xfrm>
+          <a:prstGeom prst="rect">
+            <a:avLst/>
+          </a:prstGeom>
+          <a:noFill/>
+        </p:spPr>
+        <p:txBody>
+          <a:bodyPr wrap="none" rtlCol="0">
+            <a:spAutoFit/>
+          </a:bodyPr>
+          <a:lstStyle/>
+          <a:p>
+            <a:r>
+              <a:rPr kumimoji="1" lang="zh-CN" altLang="en-US" b="1" dirty="0"/>
+              <a:t>多目标多视角三维骨架重建</a:t>
+            </a:r>
+            <a:r>
+              <a:rPr kumimoji="1" lang="en-US" altLang="zh-CN" b="1" dirty="0"/>
+              <a:t>——</a:t>
+            </a:r>
+            <a:r>
+              <a:rPr kumimoji="1" lang="zh-CN" altLang="en-US" b="1" dirty="0"/>
+              <a:t>技术思路</a:t>
+            </a:r>
+          </a:p>
+        </p:txBody>
+      </p:sp>
+      <p:sp>
+        <p:nvSpPr>
+          <p:cNvPr id="2" name="文本框 1">
+            <a:extLst>
+              <a:ext uri="{FF2B5EF4-FFF2-40B4-BE49-F238E27FC236}">
+                <a16:creationId xmlns:a16="http://schemas.microsoft.com/office/drawing/2014/main" id="{DBEE2664-1765-9146-82B2-19E67E5B96C6}"/>
+              </a:ext>
+            </a:extLst>
+          </p:cNvPr>
+          <p:cNvSpPr txBox="1"/>
+          <p:nvPr/>
+        </p:nvSpPr>
+        <p:spPr>
+          <a:xfrm>
+            <a:off x="193963" y="738846"/>
+            <a:ext cx="4628190" cy="369332"/>
+          </a:xfrm>
+          <a:prstGeom prst="rect">
+            <a:avLst/>
+          </a:prstGeom>
+          <a:noFill/>
+        </p:spPr>
+        <p:txBody>
+          <a:bodyPr wrap="none" rtlCol="0">
+            <a:spAutoFit/>
+          </a:bodyPr>
+          <a:lstStyle/>
+          <a:p>
+            <a:pPr marL="285750" indent="-285750">
+              <a:buFont typeface="Wingdings" pitchFamily="2" charset="2"/>
+              <a:buChar char="Ø"/>
+            </a:pPr>
+            <a:r>
+              <a:rPr kumimoji="1" lang="zh-CN" altLang="en-US" dirty="0"/>
+              <a:t>获得高精度的双目图片（涉及相机同步）</a:t>
+            </a:r>
+            <a:endParaRPr kumimoji="1" lang="en-US" altLang="zh-CN" dirty="0"/>
+          </a:p>
+        </p:txBody>
+      </p:sp>
+      <p:sp>
+        <p:nvSpPr>
+          <p:cNvPr id="6" name="文本框 5">
+            <a:extLst>
+              <a:ext uri="{FF2B5EF4-FFF2-40B4-BE49-F238E27FC236}">
+                <a16:creationId xmlns:a16="http://schemas.microsoft.com/office/drawing/2014/main" id="{59B1C6DD-394B-E841-83DD-527983A3B983}"/>
+              </a:ext>
+            </a:extLst>
+          </p:cNvPr>
+          <p:cNvSpPr txBox="1"/>
+          <p:nvPr/>
+        </p:nvSpPr>
+        <p:spPr>
+          <a:xfrm>
+            <a:off x="193963" y="1768636"/>
+            <a:ext cx="3823483" cy="369332"/>
+          </a:xfrm>
+          <a:prstGeom prst="rect">
+            <a:avLst/>
+          </a:prstGeom>
+          <a:noFill/>
+        </p:spPr>
+        <p:txBody>
+          <a:bodyPr wrap="none" rtlCol="0">
+            <a:spAutoFit/>
+          </a:bodyPr>
+          <a:lstStyle/>
+          <a:p>
+            <a:pPr marL="285750" indent="-285750">
+              <a:buFont typeface="Wingdings" pitchFamily="2" charset="2"/>
+              <a:buChar char="Ø"/>
+            </a:pPr>
+            <a:r>
+              <a:rPr kumimoji="1" lang="en-US" altLang="zh-CN" dirty="0"/>
+              <a:t>2D</a:t>
+            </a:r>
+            <a:r>
+              <a:rPr kumimoji="1" lang="zh-CN" altLang="en-US" dirty="0"/>
+              <a:t> </a:t>
+            </a:r>
+            <a:r>
+              <a:rPr kumimoji="1" lang="en-US" altLang="zh-CN" dirty="0"/>
+              <a:t>pose</a:t>
+            </a:r>
+            <a:r>
+              <a:rPr kumimoji="1" lang="zh-CN" altLang="en-US" dirty="0"/>
+              <a:t> </a:t>
+            </a:r>
+            <a:r>
+              <a:rPr kumimoji="1" lang="en-US" altLang="zh-CN" dirty="0"/>
+              <a:t>estimation</a:t>
+            </a:r>
+            <a:r>
+              <a:rPr kumimoji="1" lang="zh-CN" altLang="en-US" dirty="0"/>
+              <a:t> </a:t>
+            </a:r>
+            <a:r>
+              <a:rPr kumimoji="1" lang="en-US" altLang="zh-CN" dirty="0"/>
+              <a:t>and</a:t>
+            </a:r>
+            <a:r>
+              <a:rPr kumimoji="1" lang="zh-CN" altLang="en-US" dirty="0"/>
+              <a:t> </a:t>
+            </a:r>
+            <a:r>
+              <a:rPr kumimoji="1" lang="en-US" altLang="zh-CN" dirty="0"/>
+              <a:t>detection</a:t>
+            </a:r>
+          </a:p>
+        </p:txBody>
+      </p:sp>
+      <p:pic>
+        <p:nvPicPr>
+          <p:cNvPr id="7" name="图片 6">
+            <a:extLst>
+              <a:ext uri="{FF2B5EF4-FFF2-40B4-BE49-F238E27FC236}">
+                <a16:creationId xmlns:a16="http://schemas.microsoft.com/office/drawing/2014/main" id="{38B2DAB6-3CBE-1447-A331-DD47C9D9B311}"/>
+              </a:ext>
+            </a:extLst>
+          </p:cNvPr>
+          <p:cNvPicPr>
+            <a:picLocks noChangeAspect="1"/>
+          </p:cNvPicPr>
+          <p:nvPr/>
+        </p:nvPicPr>
+        <p:blipFill>
+          <a:blip r:embed="rId2"/>
+          <a:stretch>
+            <a:fillRect/>
+          </a:stretch>
+        </p:blipFill>
+        <p:spPr>
+          <a:xfrm>
+            <a:off x="1166582" y="2299663"/>
+            <a:ext cx="3512011" cy="2216727"/>
+          </a:xfrm>
+          <a:prstGeom prst="rect">
+            <a:avLst/>
+          </a:prstGeom>
+        </p:spPr>
+      </p:pic>
+      <p:sp>
+        <p:nvSpPr>
+          <p:cNvPr id="8" name="文本框 7">
+            <a:extLst>
+              <a:ext uri="{FF2B5EF4-FFF2-40B4-BE49-F238E27FC236}">
+                <a16:creationId xmlns:a16="http://schemas.microsoft.com/office/drawing/2014/main" id="{36FFCD87-8E2F-954B-A82D-CD1C784C36A4}"/>
+              </a:ext>
+            </a:extLst>
+          </p:cNvPr>
+          <p:cNvSpPr txBox="1"/>
+          <p:nvPr/>
+        </p:nvSpPr>
+        <p:spPr>
+          <a:xfrm>
+            <a:off x="193963" y="4839780"/>
+            <a:ext cx="2818400" cy="369332"/>
+          </a:xfrm>
+          <a:prstGeom prst="rect">
+            <a:avLst/>
+          </a:prstGeom>
+          <a:noFill/>
+        </p:spPr>
+        <p:txBody>
+          <a:bodyPr wrap="none" rtlCol="0">
+            <a:spAutoFit/>
+          </a:bodyPr>
+          <a:lstStyle/>
+          <a:p>
+            <a:pPr marL="285750" indent="-285750">
+              <a:buFont typeface="Wingdings" pitchFamily="2" charset="2"/>
+              <a:buChar char="Ø"/>
+            </a:pPr>
+            <a:r>
+              <a:rPr kumimoji="1" lang="en-US" altLang="zh-CN" dirty="0"/>
+              <a:t>People</a:t>
+            </a:r>
+            <a:r>
+              <a:rPr kumimoji="1" lang="zh-CN" altLang="en-US" dirty="0"/>
+              <a:t> </a:t>
+            </a:r>
+            <a:r>
+              <a:rPr kumimoji="1" lang="en-US" altLang="zh-CN" dirty="0"/>
+              <a:t>correspondence</a:t>
+            </a:r>
+          </a:p>
+        </p:txBody>
+      </p:sp>
+      <p:sp>
+        <p:nvSpPr>
+          <p:cNvPr id="9" name="文本框 8">
+            <a:extLst>
+              <a:ext uri="{FF2B5EF4-FFF2-40B4-BE49-F238E27FC236}">
+                <a16:creationId xmlns:a16="http://schemas.microsoft.com/office/drawing/2014/main" id="{8C10D370-6017-9148-8FE5-B1C1C1B04F06}"/>
+              </a:ext>
+            </a:extLst>
+          </p:cNvPr>
+          <p:cNvSpPr txBox="1"/>
+          <p:nvPr/>
+        </p:nvSpPr>
+        <p:spPr>
+          <a:xfrm>
+            <a:off x="498763" y="5347836"/>
+            <a:ext cx="1745991" cy="369332"/>
+          </a:xfrm>
+          <a:prstGeom prst="rect">
+            <a:avLst/>
+          </a:prstGeom>
+          <a:noFill/>
+        </p:spPr>
+        <p:txBody>
+          <a:bodyPr wrap="none" rtlCol="0">
+            <a:spAutoFit/>
+          </a:bodyPr>
+          <a:lstStyle/>
+          <a:p>
+            <a:pPr marL="285750" indent="-285750">
+              <a:buFont typeface="Arial" panose="020B0604020202020204" pitchFamily="34" charset="0"/>
+              <a:buChar char="•"/>
+            </a:pPr>
+            <a:r>
+              <a:rPr kumimoji="1" lang="en-US" altLang="zh-CN" dirty="0"/>
+              <a:t>ReID</a:t>
+            </a:r>
+            <a:r>
+              <a:rPr kumimoji="1" lang="zh-CN" altLang="en-US" dirty="0"/>
+              <a:t> </a:t>
+            </a:r>
+            <a:r>
+              <a:rPr kumimoji="1" lang="en-US" altLang="zh-CN" dirty="0"/>
+              <a:t>Feature</a:t>
+            </a:r>
+            <a:endParaRPr kumimoji="1" lang="zh-CN" altLang="en-US" dirty="0"/>
+          </a:p>
+        </p:txBody>
+      </p:sp>
+      <p:sp>
+        <p:nvSpPr>
+          <p:cNvPr id="10" name="文本框 9">
+            <a:extLst>
+              <a:ext uri="{FF2B5EF4-FFF2-40B4-BE49-F238E27FC236}">
+                <a16:creationId xmlns:a16="http://schemas.microsoft.com/office/drawing/2014/main" id="{46750261-2A17-314F-B902-68D1AB125976}"/>
+              </a:ext>
+            </a:extLst>
+          </p:cNvPr>
+          <p:cNvSpPr txBox="1"/>
+          <p:nvPr/>
+        </p:nvSpPr>
+        <p:spPr>
+          <a:xfrm>
+            <a:off x="852798" y="5855892"/>
+            <a:ext cx="3647152" cy="646331"/>
+          </a:xfrm>
+          <a:prstGeom prst="rect">
+            <a:avLst/>
+          </a:prstGeom>
+          <a:noFill/>
+        </p:spPr>
+        <p:txBody>
+          <a:bodyPr wrap="none" rtlCol="0">
+            <a:spAutoFit/>
+          </a:bodyPr>
+          <a:lstStyle/>
+          <a:p>
+            <a:r>
+              <a:rPr kumimoji="1" lang="zh-CN" altLang="en-US" dirty="0"/>
+              <a:t>对人的特征描述，视角、尺度不变</a:t>
+            </a:r>
+            <a:endParaRPr kumimoji="1" lang="en-US" altLang="zh-CN" dirty="0"/>
+          </a:p>
+          <a:p>
+            <a:r>
+              <a:rPr kumimoji="1" lang="zh-CN" altLang="en-US" dirty="0"/>
+              <a:t>且不同人差异巨大</a:t>
+            </a:r>
+          </a:p>
+        </p:txBody>
+      </p:sp>
+      <p:sp>
+        <p:nvSpPr>
+          <p:cNvPr id="11" name="文本框 10">
+            <a:extLst>
+              <a:ext uri="{FF2B5EF4-FFF2-40B4-BE49-F238E27FC236}">
+                <a16:creationId xmlns:a16="http://schemas.microsoft.com/office/drawing/2014/main" id="{465149F9-47A8-D643-8ABC-08ACBCA9792A}"/>
+              </a:ext>
+            </a:extLst>
+          </p:cNvPr>
+          <p:cNvSpPr txBox="1"/>
+          <p:nvPr/>
+        </p:nvSpPr>
+        <p:spPr>
+          <a:xfrm>
+            <a:off x="5453392" y="337065"/>
+            <a:ext cx="2303836" cy="369332"/>
+          </a:xfrm>
+          <a:prstGeom prst="rect">
+            <a:avLst/>
+          </a:prstGeom>
+          <a:noFill/>
+        </p:spPr>
+        <p:txBody>
+          <a:bodyPr wrap="none" rtlCol="0">
+            <a:spAutoFit/>
+          </a:bodyPr>
+          <a:lstStyle/>
+          <a:p>
+            <a:pPr marL="285750" indent="-285750">
+              <a:buFont typeface="Arial" panose="020B0604020202020204" pitchFamily="34" charset="0"/>
+              <a:buChar char="•"/>
+            </a:pPr>
+            <a:r>
+              <a:rPr kumimoji="1" lang="en-US" altLang="zh-CN" dirty="0" err="1"/>
+              <a:t>Epipolar</a:t>
+            </a:r>
+            <a:r>
+              <a:rPr kumimoji="1" lang="zh-CN" altLang="en-US" dirty="0"/>
+              <a:t> </a:t>
+            </a:r>
+            <a:r>
+              <a:rPr kumimoji="1" lang="en-US" altLang="zh-CN" dirty="0"/>
+              <a:t>geometry</a:t>
+            </a:r>
+            <a:endParaRPr kumimoji="1" lang="zh-CN" altLang="en-US" dirty="0"/>
+          </a:p>
+        </p:txBody>
+      </p:sp>
+      <p:sp>
+        <p:nvSpPr>
+          <p:cNvPr id="12" name="文本框 11">
+            <a:extLst>
+              <a:ext uri="{FF2B5EF4-FFF2-40B4-BE49-F238E27FC236}">
+                <a16:creationId xmlns:a16="http://schemas.microsoft.com/office/drawing/2014/main" id="{43F823AB-C6AD-F849-95DC-F405518CF91E}"/>
+              </a:ext>
+            </a:extLst>
+          </p:cNvPr>
+          <p:cNvSpPr txBox="1"/>
+          <p:nvPr/>
+        </p:nvSpPr>
+        <p:spPr>
+          <a:xfrm>
+            <a:off x="498763" y="1145276"/>
+            <a:ext cx="1745991" cy="369332"/>
+          </a:xfrm>
+          <a:prstGeom prst="rect">
+            <a:avLst/>
+          </a:prstGeom>
+          <a:noFill/>
+        </p:spPr>
+        <p:txBody>
+          <a:bodyPr wrap="none" rtlCol="0">
+            <a:spAutoFit/>
+          </a:bodyPr>
+          <a:lstStyle/>
+          <a:p>
+            <a:pPr marL="285750" indent="-285750">
+              <a:buFont typeface="Arial" panose="020B0604020202020204" pitchFamily="34" charset="0"/>
+              <a:buChar char="•"/>
+            </a:pPr>
+            <a:r>
+              <a:rPr kumimoji="1" lang="en-US" altLang="zh-CN" dirty="0"/>
+              <a:t>ReID</a:t>
+            </a:r>
+            <a:r>
+              <a:rPr kumimoji="1" lang="zh-CN" altLang="en-US" dirty="0"/>
+              <a:t> </a:t>
+            </a:r>
+            <a:r>
+              <a:rPr kumimoji="1" lang="en-US" altLang="zh-CN" dirty="0"/>
+              <a:t>Feature</a:t>
+            </a:r>
+            <a:endParaRPr kumimoji="1" lang="zh-CN" altLang="en-US" dirty="0"/>
+          </a:p>
+        </p:txBody>
+      </p:sp>
+      <p:pic>
+        <p:nvPicPr>
+          <p:cNvPr id="5" name="图片 4">
+            <a:extLst>
+              <a:ext uri="{FF2B5EF4-FFF2-40B4-BE49-F238E27FC236}">
+                <a16:creationId xmlns:a16="http://schemas.microsoft.com/office/drawing/2014/main" id="{E6F61C81-89B1-5E43-8845-BAF1CD7C748A}"/>
+              </a:ext>
+            </a:extLst>
+          </p:cNvPr>
+          <p:cNvPicPr>
+            <a:picLocks noChangeAspect="1"/>
+          </p:cNvPicPr>
+          <p:nvPr/>
+        </p:nvPicPr>
+        <p:blipFill>
+          <a:blip r:embed="rId3"/>
+          <a:stretch>
+            <a:fillRect/>
+          </a:stretch>
+        </p:blipFill>
+        <p:spPr>
+          <a:xfrm>
+            <a:off x="5453392" y="738846"/>
+            <a:ext cx="6364536" cy="2462734"/>
+          </a:xfrm>
+          <a:prstGeom prst="rect">
+            <a:avLst/>
+          </a:prstGeom>
+        </p:spPr>
+      </p:pic>
+      <p:sp>
+        <p:nvSpPr>
+          <p:cNvPr id="13" name="文本框 12">
+            <a:extLst>
+              <a:ext uri="{FF2B5EF4-FFF2-40B4-BE49-F238E27FC236}">
+                <a16:creationId xmlns:a16="http://schemas.microsoft.com/office/drawing/2014/main" id="{D86CAA82-45F7-C342-922E-C092237566D2}"/>
+              </a:ext>
+            </a:extLst>
+          </p:cNvPr>
+          <p:cNvSpPr txBox="1"/>
+          <p:nvPr/>
+        </p:nvSpPr>
+        <p:spPr>
+          <a:xfrm>
+            <a:off x="5453392" y="3201580"/>
+            <a:ext cx="3978974" cy="369332"/>
+          </a:xfrm>
+          <a:prstGeom prst="rect">
+            <a:avLst/>
+          </a:prstGeom>
+          <a:noFill/>
+        </p:spPr>
+        <p:txBody>
+          <a:bodyPr wrap="none" rtlCol="0">
+            <a:spAutoFit/>
+          </a:bodyPr>
+          <a:lstStyle/>
+          <a:p>
+            <a:pPr marL="285750" indent="-285750">
+              <a:buFont typeface="Arial" panose="020B0604020202020204" pitchFamily="34" charset="0"/>
+              <a:buChar char="•"/>
+            </a:pPr>
+            <a:r>
+              <a:rPr kumimoji="1" lang="en-US" altLang="zh-CN" dirty="0"/>
+              <a:t>Optimization</a:t>
+            </a:r>
+            <a:r>
+              <a:rPr kumimoji="1" lang="zh-CN" altLang="en-US" dirty="0"/>
+              <a:t> </a:t>
+            </a:r>
+            <a:r>
+              <a:rPr kumimoji="1" lang="en-US" altLang="zh-CN" dirty="0"/>
+              <a:t>algorithm</a:t>
+            </a:r>
+            <a:r>
+              <a:rPr kumimoji="1" lang="zh-CN" altLang="en-US" dirty="0"/>
+              <a:t> </a:t>
+            </a:r>
+            <a:r>
+              <a:rPr kumimoji="1" lang="en-US" altLang="zh-CN" dirty="0"/>
+              <a:t>if</a:t>
+            </a:r>
+            <a:r>
+              <a:rPr kumimoji="1" lang="zh-CN" altLang="en-US" dirty="0"/>
+              <a:t> </a:t>
+            </a:r>
+            <a:r>
+              <a:rPr kumimoji="1" lang="en-US" altLang="zh-CN" dirty="0"/>
+              <a:t>necessary</a:t>
+            </a:r>
+            <a:endParaRPr kumimoji="1" lang="zh-CN" altLang="en-US" dirty="0"/>
+          </a:p>
+        </p:txBody>
+      </p:sp>
+      <p:sp>
+        <p:nvSpPr>
+          <p:cNvPr id="14" name="文本框 13">
+            <a:extLst>
+              <a:ext uri="{FF2B5EF4-FFF2-40B4-BE49-F238E27FC236}">
+                <a16:creationId xmlns:a16="http://schemas.microsoft.com/office/drawing/2014/main" id="{D996BFF5-3011-434A-9EF9-C13BE292E9AA}"/>
+              </a:ext>
+            </a:extLst>
+          </p:cNvPr>
+          <p:cNvSpPr txBox="1"/>
+          <p:nvPr/>
+        </p:nvSpPr>
+        <p:spPr>
+          <a:xfrm>
+            <a:off x="5095558" y="3925356"/>
+            <a:ext cx="2781531" cy="369332"/>
+          </a:xfrm>
+          <a:prstGeom prst="rect">
+            <a:avLst/>
+          </a:prstGeom>
+          <a:noFill/>
+        </p:spPr>
+        <p:txBody>
+          <a:bodyPr wrap="none" rtlCol="0">
+            <a:spAutoFit/>
+          </a:bodyPr>
+          <a:lstStyle/>
+          <a:p>
+            <a:pPr marL="285750" indent="-285750">
+              <a:buFont typeface="Wingdings" pitchFamily="2" charset="2"/>
+              <a:buChar char="Ø"/>
+            </a:pPr>
+            <a:r>
+              <a:rPr kumimoji="1" lang="en-US" altLang="zh-CN" dirty="0"/>
+              <a:t>3D</a:t>
+            </a:r>
+            <a:r>
+              <a:rPr kumimoji="1" lang="zh-CN" altLang="en-US" dirty="0"/>
+              <a:t> </a:t>
+            </a:r>
+            <a:r>
+              <a:rPr kumimoji="1" lang="en-US" altLang="zh-CN" dirty="0"/>
+              <a:t>pose</a:t>
+            </a:r>
+            <a:r>
+              <a:rPr kumimoji="1" lang="zh-CN" altLang="en-US" dirty="0"/>
+              <a:t> </a:t>
+            </a:r>
+            <a:r>
+              <a:rPr kumimoji="1" lang="en-US" altLang="zh-CN" dirty="0"/>
+              <a:t>reconstruction</a:t>
+            </a:r>
+          </a:p>
+        </p:txBody>
+      </p:sp>
+      <p:pic>
+        <p:nvPicPr>
+          <p:cNvPr id="16" name="图片 15">
+            <a:extLst>
+              <a:ext uri="{FF2B5EF4-FFF2-40B4-BE49-F238E27FC236}">
+                <a16:creationId xmlns:a16="http://schemas.microsoft.com/office/drawing/2014/main" id="{21560738-8E81-0044-9612-1F0D3E1E810A}"/>
+              </a:ext>
+            </a:extLst>
+          </p:cNvPr>
+          <p:cNvPicPr>
+            <a:picLocks noChangeAspect="1"/>
+          </p:cNvPicPr>
+          <p:nvPr/>
+        </p:nvPicPr>
+        <p:blipFill>
+          <a:blip r:embed="rId4"/>
+          <a:stretch>
+            <a:fillRect/>
+          </a:stretch>
+        </p:blipFill>
+        <p:spPr>
+          <a:xfrm>
+            <a:off x="8848715" y="3849346"/>
+            <a:ext cx="2632969" cy="2719532"/>
+          </a:xfrm>
+          <a:prstGeom prst="rect">
+            <a:avLst/>
+          </a:prstGeom>
+        </p:spPr>
+      </p:pic>
+      <p:sp>
+        <p:nvSpPr>
+          <p:cNvPr id="17" name="文本框 16">
+            <a:extLst>
+              <a:ext uri="{FF2B5EF4-FFF2-40B4-BE49-F238E27FC236}">
+                <a16:creationId xmlns:a16="http://schemas.microsoft.com/office/drawing/2014/main" id="{FEE8B03A-6336-7047-883B-0EC764EFBBBF}"/>
+              </a:ext>
+            </a:extLst>
+          </p:cNvPr>
+          <p:cNvSpPr txBox="1"/>
+          <p:nvPr/>
+        </p:nvSpPr>
+        <p:spPr>
+          <a:xfrm>
+            <a:off x="5471576" y="4422903"/>
+            <a:ext cx="3012363" cy="369332"/>
+          </a:xfrm>
+          <a:prstGeom prst="rect">
+            <a:avLst/>
+          </a:prstGeom>
+          <a:noFill/>
+        </p:spPr>
+        <p:txBody>
+          <a:bodyPr wrap="none" rtlCol="0">
+            <a:spAutoFit/>
+          </a:bodyPr>
+          <a:lstStyle/>
+          <a:p>
+            <a:pPr marL="285750" indent="-285750">
+              <a:buFont typeface="Arial" panose="020B0604020202020204" pitchFamily="34" charset="0"/>
+              <a:buChar char="•"/>
+            </a:pPr>
+            <a:r>
+              <a:rPr kumimoji="1" lang="zh-CN" altLang="en-US" dirty="0"/>
+              <a:t>利用相机信息的朴素重建</a:t>
+            </a:r>
+          </a:p>
+        </p:txBody>
+      </p:sp>
+      <p:sp>
+        <p:nvSpPr>
+          <p:cNvPr id="18" name="文本框 17">
+            <a:extLst>
+              <a:ext uri="{FF2B5EF4-FFF2-40B4-BE49-F238E27FC236}">
+                <a16:creationId xmlns:a16="http://schemas.microsoft.com/office/drawing/2014/main" id="{A9FD49DE-1FAD-3B47-8260-0773CE23291C}"/>
+              </a:ext>
+            </a:extLst>
+          </p:cNvPr>
+          <p:cNvSpPr txBox="1"/>
+          <p:nvPr/>
+        </p:nvSpPr>
+        <p:spPr>
+          <a:xfrm>
+            <a:off x="5471576" y="4920450"/>
+            <a:ext cx="2031325" cy="646331"/>
+          </a:xfrm>
+          <a:prstGeom prst="rect">
+            <a:avLst/>
+          </a:prstGeom>
+          <a:noFill/>
+        </p:spPr>
+        <p:txBody>
+          <a:bodyPr wrap="none" rtlCol="0">
+            <a:spAutoFit/>
+          </a:bodyPr>
+          <a:lstStyle/>
+          <a:p>
+            <a:pPr marL="285750" indent="-285750">
+              <a:buFont typeface="Arial" panose="020B0604020202020204" pitchFamily="34" charset="0"/>
+              <a:buChar char="•"/>
+            </a:pPr>
+            <a:r>
+              <a:rPr kumimoji="1" lang="zh-CN" altLang="en-US" dirty="0"/>
+              <a:t>计算极大似然</a:t>
+            </a:r>
+            <a:endParaRPr kumimoji="1" lang="en-US" altLang="zh-CN" dirty="0"/>
+          </a:p>
+          <a:p>
+            <a:r>
+              <a:rPr kumimoji="1" lang="zh-CN" altLang="en-US" dirty="0"/>
+              <a:t>（多目相机情况）</a:t>
+            </a:r>
+            <a:endParaRPr kumimoji="1" lang="en-US" altLang="zh-CN" dirty="0"/>
+          </a:p>
+        </p:txBody>
+      </p:sp>
+      <p:sp>
+        <p:nvSpPr>
+          <p:cNvPr id="19" name="文本框 18">
+            <a:extLst>
+              <a:ext uri="{FF2B5EF4-FFF2-40B4-BE49-F238E27FC236}">
+                <a16:creationId xmlns:a16="http://schemas.microsoft.com/office/drawing/2014/main" id="{07F01C7E-23E3-B540-A6E1-13BB20BE71BF}"/>
+              </a:ext>
+            </a:extLst>
+          </p:cNvPr>
+          <p:cNvSpPr txBox="1"/>
+          <p:nvPr/>
+        </p:nvSpPr>
+        <p:spPr>
+          <a:xfrm>
+            <a:off x="5471576" y="5622818"/>
+            <a:ext cx="2550698" cy="369332"/>
+          </a:xfrm>
+          <a:prstGeom prst="rect">
+            <a:avLst/>
+          </a:prstGeom>
+          <a:noFill/>
+        </p:spPr>
+        <p:txBody>
+          <a:bodyPr wrap="none" rtlCol="0">
+            <a:spAutoFit/>
+          </a:bodyPr>
+          <a:lstStyle/>
+          <a:p>
+            <a:pPr marL="285750" indent="-285750">
+              <a:buFont typeface="Arial" panose="020B0604020202020204" pitchFamily="34" charset="0"/>
+              <a:buChar char="•"/>
+            </a:pPr>
+            <a:r>
+              <a:rPr kumimoji="1" lang="zh-CN" altLang="en-US" dirty="0"/>
+              <a:t>或直接利用神经网络</a:t>
+            </a:r>
+            <a:endParaRPr kumimoji="1" lang="en-US" altLang="zh-CN" dirty="0"/>
+          </a:p>
+        </p:txBody>
+      </p:sp>
+    </p:spTree>
+    <p:extLst>
+      <p:ext uri="{BB962C8B-B14F-4D97-AF65-F5344CB8AC3E}">
+        <p14:creationId xmlns:p14="http://schemas.microsoft.com/office/powerpoint/2010/main" val="352187582"/>
+      </p:ext>
+    </p:extLst>
+  </p:cSld>
+  <p:clrMapOvr>
+    <a:masterClrMapping/>
+  </p:clrMapOvr>
+</p:sld>
+</file>
+
 <file path=ppt/theme/theme1.xml><?xml version="1.0" encoding="utf-8"?>
 <a:theme xmlns:a="http://schemas.openxmlformats.org/drawingml/2006/main" name="Office 主题​​">
   <a:themeElements>

</xml_diff>